<commit_message>
Update Lecture 2 Slide
</commit_message>
<xml_diff>
--- a/Slides/PPT/Lecture2.pptx
+++ b/Slides/PPT/Lecture2.pptx
@@ -251,7 +251,7 @@
           <a:p>
             <a:fld id="{FD9F7465-78BB-4967-A6A7-EC2C7EAFC45D}" type="datetimeFigureOut">
               <a:rPr lang="zh-TW" altLang="en-US" smtClean="0"/>
-              <a:t>2020/10/21</a:t>
+              <a:t>2020/11/16</a:t>
             </a:fld>
             <a:endParaRPr lang="zh-TW" altLang="en-US"/>
           </a:p>
@@ -3698,12 +3698,7 @@
             <p:ph type="ctrTitle"/>
           </p:nvPr>
         </p:nvSpPr>
-        <p:spPr>
-          <a:xfrm>
-            <a:off x="1524000" y="1220270"/>
-            <a:ext cx="9144000" cy="2387600"/>
-          </a:xfrm>
-        </p:spPr>
+        <p:spPr/>
         <p:txBody>
           <a:bodyPr>
             <a:normAutofit/>
@@ -5817,7 +5812,7 @@
                           </a:solidFill>
                           <a:latin typeface="Cambria Math" panose="02040503050406030204" pitchFamily="18" charset="0"/>
                         </a:rPr>
-                        <m:t>=1∗0</m:t>
+                        <m:t>=3∗0</m:t>
                       </m:r>
                     </m:oMath>
                   </m:oMathPara>
@@ -8245,18 +8240,6 @@
                       </m:sSupPr>
                       <m:e>
                         <m:r>
-                          <a:rPr lang="en-US" altLang="zh-TW" b="0" i="1" smtClean="0">
-                            <a:latin typeface="Cambria Math" panose="02040503050406030204" pitchFamily="18" charset="0"/>
-                          </a:rPr>
-                          <m:t>𝑓</m:t>
-                        </m:r>
-                        <m:r>
-                          <a:rPr lang="en-US" altLang="zh-TW" b="0" i="1" smtClean="0">
-                            <a:latin typeface="Cambria Math" panose="02040503050406030204" pitchFamily="18" charset="0"/>
-                          </a:rPr>
-                          <m:t>(</m:t>
-                        </m:r>
-                        <m:r>
                           <a:rPr lang="en-US" altLang="zh-TW" i="1">
                             <a:latin typeface="Cambria Math" panose="02040503050406030204" pitchFamily="18" charset="0"/>
                           </a:rPr>
@@ -8297,12 +8280,6 @@
                         </m:r>
                       </m:sup>
                     </m:sSup>
-                    <m:r>
-                      <a:rPr lang="en-US" altLang="zh-TW" b="0" i="1" smtClean="0">
-                        <a:latin typeface="Cambria Math" panose="02040503050406030204" pitchFamily="18" charset="0"/>
-                      </a:rPr>
-                      <m:t>)</m:t>
-                    </m:r>
                   </m:oMath>
                 </a14:m>
                 <a:endParaRPr lang="en-US" altLang="zh-TW" dirty="0"/>
@@ -11630,315 +11607,77 @@
           </a:p>
         </p:txBody>
       </p:sp>
-      <mc:AlternateContent xmlns:mc="http://schemas.openxmlformats.org/markup-compatibility/2006" xmlns:a14="http://schemas.microsoft.com/office/drawing/2010/main">
-        <mc:Choice Requires="a14">
-          <p:sp>
-            <p:nvSpPr>
-              <p:cNvPr id="3" name="內容版面配置區 2"/>
-              <p:cNvSpPr>
-                <a:spLocks noGrp="1"/>
-              </p:cNvSpPr>
-              <p:nvPr>
-                <p:ph idx="1"/>
-              </p:nvPr>
-            </p:nvSpPr>
-            <p:spPr/>
-            <p:txBody>
-              <a:bodyPr/>
-              <a:lstStyle/>
-              <a:p>
-                <a:r>
-                  <a:rPr lang="zh-TW" altLang="en-US" dirty="0" smtClean="0"/>
-                  <a:t>每個節點以拓樸排序</a:t>
-                </a:r>
-                <a:endParaRPr lang="en-US" altLang="zh-TW" dirty="0" smtClean="0"/>
-              </a:p>
-              <a:p>
-                <a:r>
-                  <a:rPr lang="zh-TW" altLang="en-US" dirty="0" smtClean="0"/>
-                  <a:t>前向傳播</a:t>
-                </a:r>
-                <a:endParaRPr lang="en-US" altLang="zh-TW" dirty="0" smtClean="0"/>
-              </a:p>
-              <a:p>
-                <a:pPr lvl="1"/>
-                <a:r>
-                  <a:rPr lang="zh-TW" altLang="en-US" dirty="0" smtClean="0"/>
-                  <a:t>以拓樸排序的方向計算每個值</a:t>
-                </a:r>
-                <a:endParaRPr lang="en-US" altLang="zh-TW" dirty="0" smtClean="0"/>
-              </a:p>
-              <a:p>
-                <a:r>
-                  <a:rPr lang="zh-TW" altLang="en-US" dirty="0" smtClean="0"/>
-                  <a:t>反向傳播</a:t>
-                </a:r>
-                <a:endParaRPr lang="en-US" altLang="zh-TW" dirty="0" smtClean="0"/>
-              </a:p>
-              <a:p>
-                <a:pPr lvl="1"/>
-                <a:r>
-                  <a:rPr lang="zh-TW" altLang="en-US" dirty="0" smtClean="0"/>
-                  <a:t>輸出的梯度初始化成</a:t>
-                </a:r>
-                <a:r>
-                  <a:rPr lang="en-US" altLang="zh-TW" dirty="0" smtClean="0"/>
-                  <a:t>1</a:t>
-                </a:r>
-              </a:p>
-              <a:p>
-                <a:pPr lvl="1"/>
-                <a:r>
-                  <a:rPr lang="zh-TW" altLang="en-US" dirty="0" smtClean="0"/>
-                  <a:t>每個節點將以反拓樸方向走訪</a:t>
-                </a:r>
-                <a:endParaRPr lang="en-US" altLang="zh-TW" dirty="0" smtClean="0"/>
-              </a:p>
-              <a:p>
-                <a:pPr lvl="1"/>
-                <a14:m>
-                  <m:oMath xmlns:m="http://schemas.openxmlformats.org/officeDocument/2006/math">
-                    <m:f>
-                      <m:fPr>
-                        <m:ctrlPr>
-                          <a:rPr lang="en-US" altLang="zh-TW" i="1">
-                            <a:latin typeface="Cambria Math" panose="02040503050406030204" pitchFamily="18" charset="0"/>
-                          </a:rPr>
-                        </m:ctrlPr>
-                      </m:fPr>
-                      <m:num>
-                        <m:r>
-                          <a:rPr lang="zh-TW" altLang="en-US" i="1">
-                            <a:latin typeface="Cambria Math" panose="02040503050406030204" pitchFamily="18" charset="0"/>
-                          </a:rPr>
-                          <m:t>𝜕</m:t>
-                        </m:r>
-                        <m:r>
-                          <a:rPr lang="en-US" altLang="zh-TW" i="1">
-                            <a:latin typeface="Cambria Math" panose="02040503050406030204" pitchFamily="18" charset="0"/>
-                          </a:rPr>
-                          <m:t>𝑧</m:t>
-                        </m:r>
-                      </m:num>
-                      <m:den>
-                        <m:r>
-                          <a:rPr lang="zh-TW" altLang="en-US" i="1">
-                            <a:latin typeface="Cambria Math" panose="02040503050406030204" pitchFamily="18" charset="0"/>
-                          </a:rPr>
-                          <m:t>𝜕</m:t>
-                        </m:r>
-                        <m:r>
-                          <a:rPr lang="en-US" altLang="zh-TW" i="1">
-                            <a:latin typeface="Cambria Math" panose="02040503050406030204" pitchFamily="18" charset="0"/>
-                          </a:rPr>
-                          <m:t>𝑥</m:t>
-                        </m:r>
-                      </m:den>
-                    </m:f>
-                    <m:r>
-                      <a:rPr lang="en-US" altLang="zh-TW" i="1">
-                        <a:latin typeface="Cambria Math" panose="02040503050406030204" pitchFamily="18" charset="0"/>
-                      </a:rPr>
-                      <m:t>=</m:t>
-                    </m:r>
-                    <m:nary>
-                      <m:naryPr>
-                        <m:chr m:val="∑"/>
-                        <m:limLoc m:val="subSup"/>
-                        <m:ctrlPr>
-                          <a:rPr lang="en-US" altLang="zh-TW" i="1">
-                            <a:latin typeface="Cambria Math" panose="02040503050406030204" pitchFamily="18" charset="0"/>
-                          </a:rPr>
-                        </m:ctrlPr>
-                      </m:naryPr>
-                      <m:sub>
-                        <m:r>
-                          <m:rPr>
-                            <m:brk m:alnAt="25"/>
-                          </m:rPr>
-                          <a:rPr lang="en-US" altLang="zh-TW" i="1">
-                            <a:latin typeface="Cambria Math" panose="02040503050406030204" pitchFamily="18" charset="0"/>
-                          </a:rPr>
-                          <m:t>𝑖</m:t>
-                        </m:r>
-                        <m:r>
-                          <a:rPr lang="en-US" altLang="zh-TW" i="1">
-                            <a:latin typeface="Cambria Math" panose="02040503050406030204" pitchFamily="18" charset="0"/>
-                          </a:rPr>
-                          <m:t>=1</m:t>
-                        </m:r>
-                      </m:sub>
-                      <m:sup>
-                        <m:r>
-                          <a:rPr lang="en-US" altLang="zh-TW" i="1">
-                            <a:latin typeface="Cambria Math" panose="02040503050406030204" pitchFamily="18" charset="0"/>
-                          </a:rPr>
-                          <m:t>𝑛</m:t>
-                        </m:r>
-                      </m:sup>
-                      <m:e>
-                        <m:f>
-                          <m:fPr>
-                            <m:ctrlPr>
-                              <a:rPr lang="en-US" altLang="zh-TW" i="1">
-                                <a:latin typeface="Cambria Math" panose="02040503050406030204" pitchFamily="18" charset="0"/>
-                              </a:rPr>
-                            </m:ctrlPr>
-                          </m:fPr>
-                          <m:num>
-                            <m:r>
-                              <a:rPr lang="zh-TW" altLang="en-US" i="1">
-                                <a:latin typeface="Cambria Math" panose="02040503050406030204" pitchFamily="18" charset="0"/>
-                              </a:rPr>
-                              <m:t>𝜕</m:t>
-                            </m:r>
-                            <m:r>
-                              <a:rPr lang="en-US" altLang="zh-TW" i="1">
-                                <a:latin typeface="Cambria Math" panose="02040503050406030204" pitchFamily="18" charset="0"/>
-                              </a:rPr>
-                              <m:t>𝑧</m:t>
-                            </m:r>
-                          </m:num>
-                          <m:den>
-                            <m:r>
-                              <a:rPr lang="zh-TW" altLang="en-US" i="1">
-                                <a:latin typeface="Cambria Math" panose="02040503050406030204" pitchFamily="18" charset="0"/>
-                              </a:rPr>
-                              <m:t>𝜕</m:t>
-                            </m:r>
-                            <m:sSub>
-                              <m:sSubPr>
-                                <m:ctrlPr>
-                                  <a:rPr lang="en-US" altLang="zh-TW" i="1">
-                                    <a:latin typeface="Cambria Math" panose="02040503050406030204" pitchFamily="18" charset="0"/>
-                                  </a:rPr>
-                                </m:ctrlPr>
-                              </m:sSubPr>
-                              <m:e>
-                                <m:r>
-                                  <a:rPr lang="en-US" altLang="zh-TW" i="1">
-                                    <a:latin typeface="Cambria Math" panose="02040503050406030204" pitchFamily="18" charset="0"/>
-                                  </a:rPr>
-                                  <m:t>𝑦</m:t>
-                                </m:r>
-                              </m:e>
-                              <m:sub>
-                                <m:r>
-                                  <a:rPr lang="en-US" altLang="zh-TW" i="1">
-                                    <a:latin typeface="Cambria Math" panose="02040503050406030204" pitchFamily="18" charset="0"/>
-                                  </a:rPr>
-                                  <m:t>𝑖</m:t>
-                                </m:r>
-                              </m:sub>
-                            </m:sSub>
-                          </m:den>
-                        </m:f>
-                        <m:f>
-                          <m:fPr>
-                            <m:ctrlPr>
-                              <a:rPr lang="en-US" altLang="zh-TW" i="1">
-                                <a:latin typeface="Cambria Math" panose="02040503050406030204" pitchFamily="18" charset="0"/>
-                              </a:rPr>
-                            </m:ctrlPr>
-                          </m:fPr>
-                          <m:num>
-                            <m:r>
-                              <a:rPr lang="zh-TW" altLang="en-US" i="1">
-                                <a:latin typeface="Cambria Math" panose="02040503050406030204" pitchFamily="18" charset="0"/>
-                              </a:rPr>
-                              <m:t>𝜕</m:t>
-                            </m:r>
-                            <m:sSub>
-                              <m:sSubPr>
-                                <m:ctrlPr>
-                                  <a:rPr lang="en-US" altLang="zh-TW" i="1">
-                                    <a:latin typeface="Cambria Math" panose="02040503050406030204" pitchFamily="18" charset="0"/>
-                                  </a:rPr>
-                                </m:ctrlPr>
-                              </m:sSubPr>
-                              <m:e>
-                                <m:r>
-                                  <a:rPr lang="en-US" altLang="zh-TW" i="1">
-                                    <a:latin typeface="Cambria Math" panose="02040503050406030204" pitchFamily="18" charset="0"/>
-                                  </a:rPr>
-                                  <m:t>𝑦</m:t>
-                                </m:r>
-                              </m:e>
-                              <m:sub>
-                                <m:r>
-                                  <a:rPr lang="en-US" altLang="zh-TW" i="1">
-                                    <a:latin typeface="Cambria Math" panose="02040503050406030204" pitchFamily="18" charset="0"/>
-                                  </a:rPr>
-                                  <m:t>𝑖</m:t>
-                                </m:r>
-                              </m:sub>
-                            </m:sSub>
-                          </m:num>
-                          <m:den>
-                            <m:r>
-                              <a:rPr lang="zh-TW" altLang="en-US" i="1">
-                                <a:latin typeface="Cambria Math" panose="02040503050406030204" pitchFamily="18" charset="0"/>
-                              </a:rPr>
-                              <m:t>𝜕</m:t>
-                            </m:r>
-                            <m:r>
-                              <a:rPr lang="en-US" altLang="zh-TW" i="1">
-                                <a:latin typeface="Cambria Math" panose="02040503050406030204" pitchFamily="18" charset="0"/>
-                              </a:rPr>
-                              <m:t>𝑥</m:t>
-                            </m:r>
-                          </m:den>
-                        </m:f>
-                      </m:e>
-                    </m:nary>
-                  </m:oMath>
-                </a14:m>
-                <a:endParaRPr lang="en-US" dirty="0" smtClean="0"/>
-              </a:p>
-              <a:p>
-                <a:r>
-                  <a:rPr lang="zh-TW" altLang="en-US" dirty="0" smtClean="0"/>
-                  <a:t>如果計算正確前向傳播及反向傳播的演算法複雜度相同</a:t>
-                </a:r>
-                <a:endParaRPr lang="en-US" dirty="0"/>
-              </a:p>
-            </p:txBody>
-          </p:sp>
-        </mc:Choice>
-        <mc:Fallback xmlns="">
-          <p:sp>
-            <p:nvSpPr>
-              <p:cNvPr id="3" name="內容版面配置區 2"/>
-              <p:cNvSpPr>
-                <a:spLocks noGrp="1" noRot="1" noChangeAspect="1" noMove="1" noResize="1" noEditPoints="1" noAdjustHandles="1" noChangeArrowheads="1" noChangeShapeType="1" noTextEdit="1"/>
-              </p:cNvSpPr>
-              <p:nvPr>
-                <p:ph idx="1"/>
-              </p:nvPr>
-            </p:nvSpPr>
-            <p:spPr>
-              <a:blipFill>
-                <a:blip r:embed="rId2"/>
-                <a:stretch>
-                  <a:fillRect l="-812" t="-2101"/>
-                </a:stretch>
-              </a:blipFill>
-            </p:spPr>
-            <p:txBody>
-              <a:bodyPr/>
-              <a:lstStyle/>
-              <a:p>
-                <a:r>
-                  <a:rPr lang="en-US">
-                    <a:noFill/>
-                  </a:rPr>
-                  <a:t> </a:t>
-                </a:r>
-              </a:p>
-            </p:txBody>
-          </p:sp>
-        </mc:Fallback>
-      </mc:AlternateContent>
+      <p:sp>
+        <p:nvSpPr>
+          <p:cNvPr id="3" name="內容版面配置區 2"/>
+          <p:cNvSpPr>
+            <a:spLocks noGrp="1"/>
+          </p:cNvSpPr>
+          <p:nvPr>
+            <p:ph idx="1"/>
+          </p:nvPr>
+        </p:nvSpPr>
+        <p:spPr/>
+        <p:txBody>
+          <a:bodyPr/>
+          <a:lstStyle/>
+          <a:p>
+            <a:r>
+              <a:rPr lang="zh-TW" altLang="en-US" dirty="0" smtClean="0"/>
+              <a:t>每個節點以拓樸排序</a:t>
+            </a:r>
+            <a:endParaRPr lang="en-US" altLang="zh-TW" dirty="0" smtClean="0"/>
+          </a:p>
+          <a:p>
+            <a:r>
+              <a:rPr lang="zh-TW" altLang="en-US" dirty="0" smtClean="0"/>
+              <a:t>前向傳播</a:t>
+            </a:r>
+            <a:endParaRPr lang="en-US" altLang="zh-TW" dirty="0" smtClean="0"/>
+          </a:p>
+          <a:p>
+            <a:pPr lvl="1"/>
+            <a:r>
+              <a:rPr lang="zh-TW" altLang="en-US" dirty="0" smtClean="0"/>
+              <a:t>以拓樸排序的方向計算每個值</a:t>
+            </a:r>
+            <a:endParaRPr lang="en-US" altLang="zh-TW" dirty="0" smtClean="0"/>
+          </a:p>
+          <a:p>
+            <a:r>
+              <a:rPr lang="zh-TW" altLang="en-US" dirty="0" smtClean="0"/>
+              <a:t>反向傳播</a:t>
+            </a:r>
+            <a:endParaRPr lang="en-US" altLang="zh-TW" dirty="0" smtClean="0"/>
+          </a:p>
+          <a:p>
+            <a:pPr lvl="1"/>
+            <a:r>
+              <a:rPr lang="zh-TW" altLang="en-US" dirty="0" smtClean="0"/>
+              <a:t>輸出的梯度初始化成</a:t>
+            </a:r>
+            <a:r>
+              <a:rPr lang="en-US" altLang="zh-TW" dirty="0" smtClean="0"/>
+              <a:t>1</a:t>
+            </a:r>
+          </a:p>
+          <a:p>
+            <a:pPr lvl="1"/>
+            <a:r>
+              <a:rPr lang="zh-TW" altLang="en-US" dirty="0" smtClean="0"/>
+              <a:t>每個節點將以反拓樸方向走訪</a:t>
+            </a:r>
+            <a:endParaRPr lang="en-US" dirty="0" smtClean="0"/>
+          </a:p>
+          <a:p>
+            <a:r>
+              <a:rPr lang="zh-TW" altLang="en-US" dirty="0" smtClean="0"/>
+              <a:t>如果計算正確前向傳播及反向傳播的演算法複雜度相同</a:t>
+            </a:r>
+            <a:endParaRPr lang="en-US" dirty="0"/>
+          </a:p>
+        </p:txBody>
+      </p:sp>
       <p:sp>
         <p:nvSpPr>
           <p:cNvPr id="4" name="日期版面配置區 3"/>
@@ -12017,7 +11756,7 @@
           <p:nvPr/>
         </p:nvPicPr>
         <p:blipFill>
-          <a:blip r:embed="rId3">
+          <a:blip r:embed="rId2">
             <a:extLst>
               <a:ext uri="{28A0092B-C50C-407E-A947-70E740481C1C}">
                 <a14:useLocalDpi xmlns:a14="http://schemas.microsoft.com/office/drawing/2010/main" val="0"/>
@@ -21211,10 +20950,10 @@
                       </m:fPr>
                       <m:num>
                         <m:r>
-                          <a:rPr lang="en-US" i="1">
-                            <a:latin typeface="Cambria Math" panose="02040503050406030204" pitchFamily="18" charset="0"/>
-                          </a:rPr>
-                          <m:t>𝑝</m:t>
+                          <a:rPr lang="en-US" b="0" i="1" smtClean="0">
+                            <a:latin typeface="Cambria Math" panose="02040503050406030204" pitchFamily="18" charset="0"/>
+                          </a:rPr>
+                          <m:t>𝑐</m:t>
                         </m:r>
                         <m:d>
                           <m:dPr>
@@ -28881,7 +28620,7 @@
         </p:blipFill>
         <p:spPr>
           <a:xfrm>
-            <a:off x="5544658" y="3632452"/>
+            <a:off x="5592784" y="3732205"/>
             <a:ext cx="5458554" cy="2444758"/>
           </a:xfrm>
           <a:prstGeom prst="rect">

</xml_diff>